<commit_message>
Edited and added project file with only major dates entered
</commit_message>
<xml_diff>
--- a/Team Deliverable 1/ACA Risk Adjustment EHR Enhancement - FHIRed UP - original first draft.pptx
+++ b/Team Deliverable 1/ACA Risk Adjustment EHR Enhancement - FHIRed UP - original first draft.pptx
@@ -118,6 +118,22 @@
 </p:presentation>
 </file>
 
+<file path=ppt/commentAuthors.xml><?xml version="1.0" encoding="utf-8"?>
+<p:cmAuthorLst xmlns:a="http://schemas.openxmlformats.org/drawingml/2006/main" xmlns:r="http://schemas.openxmlformats.org/officeDocument/2006/relationships" xmlns:p="http://schemas.openxmlformats.org/presentationml/2006/main">
+  <p:cmAuthor id="0" name="Tala M. Suidan" initials="TMS" lastIdx="1" clrIdx="0"/>
+</p:cmAuthorLst>
+</file>
+
+<file path=ppt/comments/comment1.xml><?xml version="1.0" encoding="utf-8"?>
+<p:cmLst xmlns:a="http://schemas.openxmlformats.org/drawingml/2006/main" xmlns:r="http://schemas.openxmlformats.org/officeDocument/2006/relationships" xmlns:p="http://schemas.openxmlformats.org/presentationml/2006/main">
+  <p:cm authorId="0" dt="2016-02-14T14:23:42.617" idx="1">
+    <p:pos x="10" y="10"/>
+    <p:text>DO we want ICD9 or ICD 10 as it's the new system being implemented
+</p:text>
+  </p:cm>
+</p:cmLst>
+</file>
+
 <file path=ppt/slideLayouts/slideLayout1.xml><?xml version="1.0" encoding="utf-8"?>
 <p:sldLayout xmlns:a="http://schemas.openxmlformats.org/drawingml/2006/main" xmlns:r="http://schemas.openxmlformats.org/officeDocument/2006/relationships" xmlns:p="http://schemas.openxmlformats.org/presentationml/2006/main" type="title" preserve="1">
   <p:cSld name="Title Slide">
@@ -299,7 +315,7 @@
           <a:p>
             <a:fld id="{0CBD4193-2F3E-4C7E-B9B9-89CD1B2B7A80}" type="datetimeFigureOut">
               <a:rPr lang="en-US" smtClean="0"/>
-              <a:t>2/11/2016</a:t>
+              <a:t>2/14/2016</a:t>
             </a:fld>
             <a:endParaRPr lang="en-US"/>
           </a:p>
@@ -469,7 +485,7 @@
           <a:p>
             <a:fld id="{0CBD4193-2F3E-4C7E-B9B9-89CD1B2B7A80}" type="datetimeFigureOut">
               <a:rPr lang="en-US" smtClean="0"/>
-              <a:t>2/11/2016</a:t>
+              <a:t>2/14/2016</a:t>
             </a:fld>
             <a:endParaRPr lang="en-US"/>
           </a:p>
@@ -649,7 +665,7 @@
           <a:p>
             <a:fld id="{0CBD4193-2F3E-4C7E-B9B9-89CD1B2B7A80}" type="datetimeFigureOut">
               <a:rPr lang="en-US" smtClean="0"/>
-              <a:t>2/11/2016</a:t>
+              <a:t>2/14/2016</a:t>
             </a:fld>
             <a:endParaRPr lang="en-US"/>
           </a:p>
@@ -819,7 +835,7 @@
           <a:p>
             <a:fld id="{0CBD4193-2F3E-4C7E-B9B9-89CD1B2B7A80}" type="datetimeFigureOut">
               <a:rPr lang="en-US" smtClean="0"/>
-              <a:t>2/11/2016</a:t>
+              <a:t>2/14/2016</a:t>
             </a:fld>
             <a:endParaRPr lang="en-US"/>
           </a:p>
@@ -1065,7 +1081,7 @@
           <a:p>
             <a:fld id="{0CBD4193-2F3E-4C7E-B9B9-89CD1B2B7A80}" type="datetimeFigureOut">
               <a:rPr lang="en-US" smtClean="0"/>
-              <a:t>2/11/2016</a:t>
+              <a:t>2/14/2016</a:t>
             </a:fld>
             <a:endParaRPr lang="en-US"/>
           </a:p>
@@ -1353,7 +1369,7 @@
           <a:p>
             <a:fld id="{0CBD4193-2F3E-4C7E-B9B9-89CD1B2B7A80}" type="datetimeFigureOut">
               <a:rPr lang="en-US" smtClean="0"/>
-              <a:t>2/11/2016</a:t>
+              <a:t>2/14/2016</a:t>
             </a:fld>
             <a:endParaRPr lang="en-US"/>
           </a:p>
@@ -1775,7 +1791,7 @@
           <a:p>
             <a:fld id="{0CBD4193-2F3E-4C7E-B9B9-89CD1B2B7A80}" type="datetimeFigureOut">
               <a:rPr lang="en-US" smtClean="0"/>
-              <a:t>2/11/2016</a:t>
+              <a:t>2/14/2016</a:t>
             </a:fld>
             <a:endParaRPr lang="en-US"/>
           </a:p>
@@ -1893,7 +1909,7 @@
           <a:p>
             <a:fld id="{0CBD4193-2F3E-4C7E-B9B9-89CD1B2B7A80}" type="datetimeFigureOut">
               <a:rPr lang="en-US" smtClean="0"/>
-              <a:t>2/11/2016</a:t>
+              <a:t>2/14/2016</a:t>
             </a:fld>
             <a:endParaRPr lang="en-US"/>
           </a:p>
@@ -1988,7 +2004,7 @@
           <a:p>
             <a:fld id="{0CBD4193-2F3E-4C7E-B9B9-89CD1B2B7A80}" type="datetimeFigureOut">
               <a:rPr lang="en-US" smtClean="0"/>
-              <a:t>2/11/2016</a:t>
+              <a:t>2/14/2016</a:t>
             </a:fld>
             <a:endParaRPr lang="en-US"/>
           </a:p>
@@ -2265,7 +2281,7 @@
           <a:p>
             <a:fld id="{0CBD4193-2F3E-4C7E-B9B9-89CD1B2B7A80}" type="datetimeFigureOut">
               <a:rPr lang="en-US" smtClean="0"/>
-              <a:t>2/11/2016</a:t>
+              <a:t>2/14/2016</a:t>
             </a:fld>
             <a:endParaRPr lang="en-US"/>
           </a:p>
@@ -2518,7 +2534,7 @@
           <a:p>
             <a:fld id="{0CBD4193-2F3E-4C7E-B9B9-89CD1B2B7A80}" type="datetimeFigureOut">
               <a:rPr lang="en-US" smtClean="0"/>
-              <a:t>2/11/2016</a:t>
+              <a:t>2/14/2016</a:t>
             </a:fld>
             <a:endParaRPr lang="en-US"/>
           </a:p>
@@ -2731,7 +2747,7 @@
           <a:p>
             <a:fld id="{0CBD4193-2F3E-4C7E-B9B9-89CD1B2B7A80}" type="datetimeFigureOut">
               <a:rPr lang="en-US" smtClean="0"/>
-              <a:t>2/11/2016</a:t>
+              <a:t>2/14/2016</a:t>
             </a:fld>
             <a:endParaRPr lang="en-US"/>
           </a:p>
@@ -3367,10 +3383,118 @@
           <a:bodyPr/>
           <a:lstStyle/>
           <a:p>
-            <a:endParaRPr lang="en-US"/>
-          </a:p>
-        </p:txBody>
-      </p:sp>
+            <a:endParaRPr lang="en-US" dirty="0"/>
+          </a:p>
+        </p:txBody>
+      </p:sp>
+      <p:pic>
+        <p:nvPicPr>
+          <p:cNvPr id="1026" name="Picture 2"/>
+          <p:cNvPicPr>
+            <a:picLocks noChangeAspect="1" noChangeArrowheads="1"/>
+          </p:cNvPicPr>
+          <p:nvPr/>
+        </p:nvPicPr>
+        <p:blipFill>
+          <a:blip r:embed="rId2">
+            <a:extLst>
+              <a:ext uri="{28A0092B-C50C-407E-A947-70E740481C1C}">
+                <a14:useLocalDpi xmlns:a14="http://schemas.microsoft.com/office/drawing/2010/main" val="0"/>
+              </a:ext>
+            </a:extLst>
+          </a:blip>
+          <a:srcRect/>
+          <a:stretch>
+            <a:fillRect/>
+          </a:stretch>
+        </p:blipFill>
+        <p:spPr bwMode="auto">
+          <a:xfrm>
+            <a:off x="29404" y="2390775"/>
+            <a:ext cx="3493167" cy="2409825"/>
+          </a:xfrm>
+          <a:prstGeom prst="rect">
+            <a:avLst/>
+          </a:prstGeom>
+          <a:noFill/>
+          <a:ln>
+            <a:noFill/>
+          </a:ln>
+          <a:extLst>
+            <a:ext uri="{909E8E84-426E-40DD-AFC4-6F175D3DCCD1}">
+              <a14:hiddenFill xmlns:a14="http://schemas.microsoft.com/office/drawing/2010/main">
+                <a:solidFill>
+                  <a:schemeClr val="accent1"/>
+                </a:solidFill>
+              </a14:hiddenFill>
+            </a:ext>
+            <a:ext uri="{91240B29-F687-4F45-9708-019B960494DF}">
+              <a14:hiddenLine xmlns:a14="http://schemas.microsoft.com/office/drawing/2010/main" w="9525">
+                <a:solidFill>
+                  <a:schemeClr val="tx1"/>
+                </a:solidFill>
+                <a:miter lim="800000"/>
+                <a:headEnd/>
+                <a:tailEnd/>
+              </a14:hiddenLine>
+            </a:ext>
+          </a:extLst>
+        </p:spPr>
+      </p:pic>
+      <p:pic>
+        <p:nvPicPr>
+          <p:cNvPr id="1028" name="Picture 4"/>
+          <p:cNvPicPr>
+            <a:picLocks noChangeAspect="1" noChangeArrowheads="1"/>
+          </p:cNvPicPr>
+          <p:nvPr/>
+        </p:nvPicPr>
+        <p:blipFill>
+          <a:blip r:embed="rId3">
+            <a:extLst>
+              <a:ext uri="{28A0092B-C50C-407E-A947-70E740481C1C}">
+                <a14:useLocalDpi xmlns:a14="http://schemas.microsoft.com/office/drawing/2010/main" val="0"/>
+              </a:ext>
+            </a:extLst>
+          </a:blip>
+          <a:srcRect/>
+          <a:stretch>
+            <a:fillRect/>
+          </a:stretch>
+        </p:blipFill>
+        <p:spPr bwMode="auto">
+          <a:xfrm>
+            <a:off x="3687003" y="2133600"/>
+            <a:ext cx="5456997" cy="2819603"/>
+          </a:xfrm>
+          <a:prstGeom prst="rect">
+            <a:avLst/>
+          </a:prstGeom>
+          <a:noFill/>
+          <a:ln>
+            <a:noFill/>
+          </a:ln>
+          <a:extLst>
+            <a:ext uri="{909E8E84-426E-40DD-AFC4-6F175D3DCCD1}">
+              <a14:hiddenFill xmlns:a14="http://schemas.microsoft.com/office/drawing/2010/main">
+                <a:solidFill>
+                  <a:schemeClr val="accent1"/>
+                </a:solidFill>
+              </a14:hiddenFill>
+            </a:ext>
+            <a:ext uri="{91240B29-F687-4F45-9708-019B960494DF}">
+              <a14:hiddenLine xmlns:a14="http://schemas.microsoft.com/office/drawing/2010/main" w="9525">
+                <a:solidFill>
+                  <a:schemeClr val="tx1"/>
+                </a:solidFill>
+                <a:miter lim="800000"/>
+                <a:headEnd/>
+                <a:tailEnd/>
+              </a14:hiddenLine>
+            </a:ext>
+          </a:extLst>
+        </p:spPr>
+      </p:pic>
     </p:spTree>
     <p:extLst>
       <p:ext uri="{BB962C8B-B14F-4D97-AF65-F5344CB8AC3E}">

</xml_diff>

<commit_message>
Redid powerpoint. added visio and other files used to create
</commit_message>
<xml_diff>
--- a/Team Deliverable 1/ACA Risk Adjustment EHR Enhancement - FHIRed UP - original first draft.pptx
+++ b/Team Deliverable 1/ACA Risk Adjustment EHR Enhancement - FHIRed UP - original first draft.pptx
@@ -315,7 +315,7 @@
           <a:p>
             <a:fld id="{0CBD4193-2F3E-4C7E-B9B9-89CD1B2B7A80}" type="datetimeFigureOut">
               <a:rPr lang="en-US" smtClean="0"/>
-              <a:t>2/14/2016</a:t>
+              <a:t>2/15/2016</a:t>
             </a:fld>
             <a:endParaRPr lang="en-US"/>
           </a:p>
@@ -485,7 +485,7 @@
           <a:p>
             <a:fld id="{0CBD4193-2F3E-4C7E-B9B9-89CD1B2B7A80}" type="datetimeFigureOut">
               <a:rPr lang="en-US" smtClean="0"/>
-              <a:t>2/14/2016</a:t>
+              <a:t>2/15/2016</a:t>
             </a:fld>
             <a:endParaRPr lang="en-US"/>
           </a:p>
@@ -665,7 +665,7 @@
           <a:p>
             <a:fld id="{0CBD4193-2F3E-4C7E-B9B9-89CD1B2B7A80}" type="datetimeFigureOut">
               <a:rPr lang="en-US" smtClean="0"/>
-              <a:t>2/14/2016</a:t>
+              <a:t>2/15/2016</a:t>
             </a:fld>
             <a:endParaRPr lang="en-US"/>
           </a:p>
@@ -835,7 +835,7 @@
           <a:p>
             <a:fld id="{0CBD4193-2F3E-4C7E-B9B9-89CD1B2B7A80}" type="datetimeFigureOut">
               <a:rPr lang="en-US" smtClean="0"/>
-              <a:t>2/14/2016</a:t>
+              <a:t>2/15/2016</a:t>
             </a:fld>
             <a:endParaRPr lang="en-US"/>
           </a:p>
@@ -1081,7 +1081,7 @@
           <a:p>
             <a:fld id="{0CBD4193-2F3E-4C7E-B9B9-89CD1B2B7A80}" type="datetimeFigureOut">
               <a:rPr lang="en-US" smtClean="0"/>
-              <a:t>2/14/2016</a:t>
+              <a:t>2/15/2016</a:t>
             </a:fld>
             <a:endParaRPr lang="en-US"/>
           </a:p>
@@ -1369,7 +1369,7 @@
           <a:p>
             <a:fld id="{0CBD4193-2F3E-4C7E-B9B9-89CD1B2B7A80}" type="datetimeFigureOut">
               <a:rPr lang="en-US" smtClean="0"/>
-              <a:t>2/14/2016</a:t>
+              <a:t>2/15/2016</a:t>
             </a:fld>
             <a:endParaRPr lang="en-US"/>
           </a:p>
@@ -1791,7 +1791,7 @@
           <a:p>
             <a:fld id="{0CBD4193-2F3E-4C7E-B9B9-89CD1B2B7A80}" type="datetimeFigureOut">
               <a:rPr lang="en-US" smtClean="0"/>
-              <a:t>2/14/2016</a:t>
+              <a:t>2/15/2016</a:t>
             </a:fld>
             <a:endParaRPr lang="en-US"/>
           </a:p>
@@ -1909,7 +1909,7 @@
           <a:p>
             <a:fld id="{0CBD4193-2F3E-4C7E-B9B9-89CD1B2B7A80}" type="datetimeFigureOut">
               <a:rPr lang="en-US" smtClean="0"/>
-              <a:t>2/14/2016</a:t>
+              <a:t>2/15/2016</a:t>
             </a:fld>
             <a:endParaRPr lang="en-US"/>
           </a:p>
@@ -2004,7 +2004,7 @@
           <a:p>
             <a:fld id="{0CBD4193-2F3E-4C7E-B9B9-89CD1B2B7A80}" type="datetimeFigureOut">
               <a:rPr lang="en-US" smtClean="0"/>
-              <a:t>2/14/2016</a:t>
+              <a:t>2/15/2016</a:t>
             </a:fld>
             <a:endParaRPr lang="en-US"/>
           </a:p>
@@ -2281,7 +2281,7 @@
           <a:p>
             <a:fld id="{0CBD4193-2F3E-4C7E-B9B9-89CD1B2B7A80}" type="datetimeFigureOut">
               <a:rPr lang="en-US" smtClean="0"/>
-              <a:t>2/14/2016</a:t>
+              <a:t>2/15/2016</a:t>
             </a:fld>
             <a:endParaRPr lang="en-US"/>
           </a:p>
@@ -2534,7 +2534,7 @@
           <a:p>
             <a:fld id="{0CBD4193-2F3E-4C7E-B9B9-89CD1B2B7A80}" type="datetimeFigureOut">
               <a:rPr lang="en-US" smtClean="0"/>
-              <a:t>2/14/2016</a:t>
+              <a:t>2/15/2016</a:t>
             </a:fld>
             <a:endParaRPr lang="en-US"/>
           </a:p>
@@ -2747,7 +2747,7 @@
           <a:p>
             <a:fld id="{0CBD4193-2F3E-4C7E-B9B9-89CD1B2B7A80}" type="datetimeFigureOut">
               <a:rPr lang="en-US" smtClean="0"/>
-              <a:t>2/14/2016</a:t>
+              <a:t>2/15/2016</a:t>
             </a:fld>
             <a:endParaRPr lang="en-US"/>
           </a:p>
@@ -4152,25 +4152,42 @@
           </a:xfrm>
         </p:spPr>
         <p:txBody>
-          <a:bodyPr/>
+          <a:bodyPr>
+            <a:normAutofit lnSpcReduction="10000"/>
+          </a:bodyPr>
           <a:lstStyle/>
           <a:p>
             <a:r>
               <a:rPr lang="en-US" dirty="0" smtClean="0"/>
-              <a:t>Augusto Burgos</a:t>
-            </a:r>
-          </a:p>
-          <a:p>
+              <a:t>Augusto </a:t>
+            </a:r>
             <a:r>
               <a:rPr lang="en-US" dirty="0" smtClean="0"/>
-              <a:t>Spiro Ganas – Business Analyst</a:t>
-            </a:r>
+              <a:t>Burgos – Co-Lead Developer</a:t>
+            </a:r>
+            <a:endParaRPr lang="en-US" dirty="0" smtClean="0"/>
           </a:p>
           <a:p>
             <a:r>
               <a:rPr lang="en-US" dirty="0" smtClean="0"/>
-              <a:t>Anja Guillory</a:t>
-            </a:r>
+              <a:t>Spiro Ganas – </a:t>
+            </a:r>
+            <a:r>
+              <a:rPr lang="en-US" dirty="0" smtClean="0"/>
+              <a:t>Project Sponsor</a:t>
+            </a:r>
+            <a:endParaRPr lang="en-US" dirty="0" smtClean="0"/>
+          </a:p>
+          <a:p>
+            <a:r>
+              <a:rPr lang="en-US" dirty="0" smtClean="0"/>
+              <a:t>Anja </a:t>
+            </a:r>
+            <a:r>
+              <a:rPr lang="en-US" dirty="0" smtClean="0"/>
+              <a:t>Guillory – Co-Lead Developer</a:t>
+            </a:r>
+            <a:endParaRPr lang="en-US" dirty="0" smtClean="0"/>
           </a:p>
           <a:p>
             <a:r>
@@ -4181,6 +4198,10 @@
               <a:rPr lang="en-US" dirty="0" err="1" smtClean="0"/>
               <a:t>Richgels</a:t>
             </a:r>
+            <a:r>
+              <a:rPr lang="en-US" dirty="0" smtClean="0"/>
+              <a:t> – UI testing and Business Analyst</a:t>
+            </a:r>
             <a:endParaRPr lang="en-US" dirty="0" smtClean="0"/>
           </a:p>
           <a:p>
@@ -4191,6 +4212,10 @@
             <a:r>
               <a:rPr lang="en-US" dirty="0" err="1" smtClean="0"/>
               <a:t>Stoneburner</a:t>
+            </a:r>
+            <a:r>
+              <a:rPr lang="en-US" dirty="0" smtClean="0"/>
+              <a:t> – Code testing</a:t>
             </a:r>
             <a:endParaRPr lang="en-US" dirty="0" smtClean="0"/>
           </a:p>

</xml_diff>